<commit_message>
Adds cloudlab chameleon and probe to diagram
Also adds binder logo. Fixes #31
</commit_message>
<xml_diff>
--- a/figures/wflow.pptx
+++ b/figures/wflow.pptx
@@ -3954,39 +3954,9 @@
       </p:grpSpPr>
       <p:cxnSp>
         <p:nvCxnSpPr>
-          <p:cNvPr id="60" name="Shape 60"/>
-          <p:cNvCxnSpPr>
-            <a:stCxn id="61" idx="4"/>
-            <a:endCxn id="62" idx="1"/>
-          </p:cNvCxnSpPr>
-          <p:nvPr/>
-        </p:nvCxnSpPr>
-        <p:spPr>
-          <a:xfrm>
-            <a:off x="15507387" y="22819299"/>
-            <a:ext cx="4225500" cy="3236700"/>
-          </a:xfrm>
-          <a:prstGeom prst="straightConnector1">
-            <a:avLst/>
-          </a:prstGeom>
-          <a:noFill/>
-          <a:ln w="76200" cap="flat" cmpd="sng">
-            <a:solidFill>
-              <a:schemeClr val="dk2"/>
-            </a:solidFill>
-            <a:prstDash val="solid"/>
-            <a:round/>
-            <a:headEnd type="triangle" w="lg" len="lg"/>
-            <a:tailEnd type="triangle" w="lg" len="lg"/>
-          </a:ln>
-        </p:spPr>
-      </p:cxnSp>
-      <p:cxnSp>
-        <p:nvCxnSpPr>
           <p:cNvPr id="63" name="Shape 63"/>
           <p:cNvCxnSpPr>
             <a:stCxn id="61" idx="6"/>
-            <a:endCxn id="64" idx="1"/>
           </p:cNvCxnSpPr>
           <p:nvPr/>
         </p:nvCxnSpPr>
@@ -4139,7 +4109,7 @@
                 </a:spcBef>
                 <a:buNone/>
               </a:pPr>
-              <a:endParaRPr/>
+              <a:endParaRPr sz="2800" dirty="0"/>
             </a:p>
           </p:txBody>
         </p:sp>
@@ -4278,9 +4248,9 @@
             <p:nvPr/>
           </p:nvCxnSpPr>
           <p:spPr>
-            <a:xfrm rot="10800000" flipH="1">
-              <a:off x="22404201" y="20199594"/>
-              <a:ext cx="1601100" cy="67200"/>
+            <a:xfrm>
+              <a:off x="22463419" y="20066368"/>
+              <a:ext cx="1542006" cy="133114"/>
             </a:xfrm>
             <a:prstGeom prst="straightConnector1">
               <a:avLst/>
@@ -4545,10 +4515,10 @@
           </p:nvGrpSpPr>
           <p:grpSpPr>
             <a:xfrm>
-              <a:off x="18095378" y="18199464"/>
-              <a:ext cx="5048099" cy="5271900"/>
-              <a:chOff x="12577041" y="5552214"/>
-              <a:chExt cx="5048099" cy="5271900"/>
+              <a:off x="18748674" y="18249596"/>
+              <a:ext cx="3458966" cy="4651820"/>
+              <a:chOff x="13230337" y="5602346"/>
+              <a:chExt cx="3458966" cy="4651820"/>
             </a:xfrm>
           </p:grpSpPr>
           <p:sp>
@@ -4558,9 +4528,9 @@
               <p:nvPr/>
             </p:nvSpPr>
             <p:spPr>
-              <a:xfrm rot="-3061049">
-                <a:off x="12888347" y="6732002"/>
-                <a:ext cx="4425488" cy="2912325"/>
+              <a:xfrm rot="18538951">
+                <a:off x="12633910" y="6198773"/>
+                <a:ext cx="4651820" cy="3458966"/>
               </a:xfrm>
               <a:prstGeom prst="ellipse">
                 <a:avLst/>
@@ -4594,7 +4564,7 @@
           </p:sp>
           <p:pic>
             <p:nvPicPr>
-              <p:cNvPr id="64" name="Shape 64"/>
+              <p:cNvPr id="84" name="Shape 84"/>
               <p:cNvPicPr preferRelativeResize="0"/>
               <p:nvPr/>
             </p:nvPicPr>
@@ -4608,35 +4578,7 @@
             </p:blipFill>
             <p:spPr>
               <a:xfrm>
-                <a:off x="13347737" y="7461725"/>
-                <a:ext cx="2409824" cy="2409824"/>
-              </a:xfrm>
-              <a:prstGeom prst="rect">
-                <a:avLst/>
-              </a:prstGeom>
-              <a:noFill/>
-              <a:ln>
-                <a:noFill/>
-              </a:ln>
-            </p:spPr>
-          </p:pic>
-          <p:pic>
-            <p:nvPicPr>
-              <p:cNvPr id="84" name="Shape 84"/>
-              <p:cNvPicPr preferRelativeResize="0"/>
-              <p:nvPr/>
-            </p:nvPicPr>
-            <p:blipFill>
-              <a:blip r:embed="rId7">
-                <a:alphaModFix/>
-              </a:blip>
-              <a:stretch>
-                <a:fillRect/>
-              </a:stretch>
-            </p:blipFill>
-            <p:spPr>
-              <a:xfrm>
-                <a:off x="14920225" y="6505073"/>
+                <a:off x="14903590" y="5882044"/>
                 <a:ext cx="1607100" cy="1612525"/>
               </a:xfrm>
               <a:prstGeom prst="rect">
@@ -4654,14 +4596,13 @@
             <p:cNvPr id="85" name="Shape 85"/>
             <p:cNvCxnSpPr>
               <a:stCxn id="62" idx="0"/>
-              <a:endCxn id="74" idx="4"/>
             </p:cNvCxnSpPr>
             <p:nvPr/>
           </p:nvCxnSpPr>
           <p:spPr>
-            <a:xfrm rot="10800000">
-              <a:off x="21751491" y="21751462"/>
-              <a:ext cx="194100" cy="2517300"/>
+            <a:xfrm flipH="1" flipV="1">
+              <a:off x="21554480" y="22224610"/>
+              <a:ext cx="391111" cy="2044152"/>
             </a:xfrm>
             <a:prstGeom prst="straightConnector1">
               <a:avLst/>
@@ -4699,7 +4640,7 @@
               <p:nvPr/>
             </p:nvPicPr>
             <p:blipFill>
-              <a:blip r:embed="rId8">
+              <a:blip r:embed="rId7">
                 <a:alphaModFix/>
               </a:blip>
               <a:stretch>
@@ -4727,7 +4668,7 @@
               <p:nvPr/>
             </p:nvPicPr>
             <p:blipFill>
-              <a:blip r:embed="rId9">
+              <a:blip r:embed="rId8">
                 <a:alphaModFix/>
               </a:blip>
               <a:stretch>
@@ -4770,7 +4711,7 @@
               <p:nvPr/>
             </p:nvPicPr>
             <p:blipFill>
-              <a:blip r:embed="rId10">
+              <a:blip r:embed="rId9">
                 <a:alphaModFix/>
               </a:blip>
               <a:stretch>
@@ -4798,7 +4739,7 @@
               <p:nvPr/>
             </p:nvPicPr>
             <p:blipFill>
-              <a:blip r:embed="rId11">
+              <a:blip r:embed="rId10">
                 <a:alphaModFix/>
               </a:blip>
               <a:stretch>
@@ -4826,7 +4767,7 @@
               <p:nvPr/>
             </p:nvPicPr>
             <p:blipFill>
-              <a:blip r:embed="rId12">
+              <a:blip r:embed="rId11">
                 <a:alphaModFix/>
               </a:blip>
               <a:stretch>
@@ -4869,7 +4810,7 @@
               <p:nvPr/>
             </p:nvPicPr>
             <p:blipFill rotWithShape="1">
-              <a:blip r:embed="rId13">
+              <a:blip r:embed="rId12">
                 <a:alphaModFix/>
               </a:blip>
               <a:srcRect l="13043" t="4643" r="43112"/>
@@ -4896,7 +4837,7 @@
               <p:nvPr/>
             </p:nvPicPr>
             <p:blipFill>
-              <a:blip r:embed="rId14">
+              <a:blip r:embed="rId13">
                 <a:alphaModFix/>
               </a:blip>
               <a:stretch>
@@ -5126,7 +5067,7 @@
           </p:nvSpPr>
           <p:spPr>
             <a:xfrm>
-              <a:off x="19485375" y="17332500"/>
+              <a:off x="19110320" y="16677738"/>
               <a:ext cx="3353099" cy="1811399"/>
             </a:xfrm>
             <a:prstGeom prst="rect">
@@ -5150,7 +5091,7 @@
                 <a:buNone/>
               </a:pPr>
               <a:r>
-                <a:rPr lang="en" sz="2300"/>
+                <a:rPr lang="en" sz="2300" dirty="0"/>
                 <a:t>Cluster configuration management, orchestration, and deployment</a:t>
               </a:r>
             </a:p>
@@ -5874,7 +5815,7 @@
           <p:nvPr/>
         </p:nvPicPr>
         <p:blipFill>
-          <a:blip r:embed="rId15"/>
+          <a:blip r:embed="rId14"/>
           <a:stretch>
             <a:fillRect/>
           </a:stretch>
@@ -5939,7 +5880,7 @@
           <p:nvPr/>
         </p:nvPicPr>
         <p:blipFill>
-          <a:blip r:embed="rId16"/>
+          <a:blip r:embed="rId15"/>
           <a:stretch>
             <a:fillRect/>
           </a:stretch>
@@ -5977,7 +5918,7 @@
             <p:nvPr/>
           </p:nvPicPr>
           <p:blipFill rotWithShape="1">
-            <a:blip r:embed="rId17"/>
+            <a:blip r:embed="rId16"/>
             <a:srcRect l="6931" t="71147" r="39891"/>
             <a:stretch/>
           </p:blipFill>
@@ -6000,7 +5941,7 @@
             <p:nvPr/>
           </p:nvPicPr>
           <p:blipFill>
-            <a:blip r:embed="rId18"/>
+            <a:blip r:embed="rId17"/>
             <a:stretch>
               <a:fillRect/>
             </a:stretch>
@@ -6016,6 +5957,196 @@
           </p:spPr>
         </p:pic>
       </p:grpSp>
+      <p:cxnSp>
+        <p:nvCxnSpPr>
+          <p:cNvPr id="60" name="Shape 60"/>
+          <p:cNvCxnSpPr>
+            <a:endCxn id="62" idx="1"/>
+          </p:cNvCxnSpPr>
+          <p:nvPr/>
+        </p:nvCxnSpPr>
+        <p:spPr>
+          <a:xfrm>
+            <a:off x="16738074" y="22819299"/>
+            <a:ext cx="2994877" cy="3236726"/>
+          </a:xfrm>
+          <a:prstGeom prst="straightConnector1">
+            <a:avLst/>
+          </a:prstGeom>
+          <a:noFill/>
+          <a:ln w="76200" cap="flat" cmpd="sng">
+            <a:solidFill>
+              <a:schemeClr val="dk2"/>
+            </a:solidFill>
+            <a:prstDash val="solid"/>
+            <a:round/>
+            <a:headEnd type="triangle" w="lg" len="lg"/>
+            <a:tailEnd type="triangle" w="lg" len="lg"/>
+          </a:ln>
+        </p:spPr>
+      </p:cxnSp>
+      <p:cxnSp>
+        <p:nvCxnSpPr>
+          <p:cNvPr id="58" name="Shape 73"/>
+          <p:cNvCxnSpPr/>
+          <p:nvPr/>
+        </p:nvCxnSpPr>
+        <p:spPr>
+          <a:xfrm flipV="1">
+            <a:off x="17524837" y="21529344"/>
+            <a:ext cx="958730" cy="845100"/>
+          </a:xfrm>
+          <a:prstGeom prst="straightConnector1">
+            <a:avLst/>
+          </a:prstGeom>
+          <a:noFill/>
+          <a:ln w="76200" cap="flat" cmpd="sng">
+            <a:solidFill>
+              <a:schemeClr val="dk2"/>
+            </a:solidFill>
+            <a:prstDash val="solid"/>
+            <a:round/>
+            <a:headEnd type="none" w="lg" len="lg"/>
+            <a:tailEnd type="triangle" w="lg" len="lg"/>
+          </a:ln>
+        </p:spPr>
+      </p:cxnSp>
+      <p:pic>
+        <p:nvPicPr>
+          <p:cNvPr id="65" name="Picture 4" descr="Chameleon"/>
+          <p:cNvPicPr>
+            <a:picLocks noChangeAspect="1" noChangeArrowheads="1"/>
+          </p:cNvPicPr>
+          <p:nvPr/>
+        </p:nvPicPr>
+        <p:blipFill>
+          <a:blip r:embed="rId18">
+            <a:extLst>
+              <a:ext uri="{28A0092B-C50C-407E-A947-70E740481C1C}">
+                <a14:useLocalDpi xmlns:a14="http://schemas.microsoft.com/office/drawing/2010/main" val="0"/>
+              </a:ext>
+            </a:extLst>
+          </a:blip>
+          <a:srcRect/>
+          <a:stretch>
+            <a:fillRect/>
+          </a:stretch>
+        </p:blipFill>
+        <p:spPr bwMode="auto">
+          <a:xfrm>
+            <a:off x="18957295" y="20627605"/>
+            <a:ext cx="2670899" cy="764966"/>
+          </a:xfrm>
+          <a:prstGeom prst="rect">
+            <a:avLst/>
+          </a:prstGeom>
+          <a:noFill/>
+          <a:extLst>
+            <a:ext uri="{909E8E84-426E-40dd-AFC4-6F175D3DCCD1}">
+              <a14:hiddenFill xmlns:a14="http://schemas.microsoft.com/office/drawing/2010/main">
+                <a:solidFill>
+                  <a:srgbClr val="FFFFFF"/>
+                </a:solidFill>
+              </a14:hiddenFill>
+            </a:ext>
+          </a:extLst>
+        </p:spPr>
+      </p:pic>
+      <p:pic>
+        <p:nvPicPr>
+          <p:cNvPr id="72" name="Picture 2" descr="CloudLab"/>
+          <p:cNvPicPr>
+            <a:picLocks noChangeAspect="1" noChangeArrowheads="1"/>
+          </p:cNvPicPr>
+          <p:nvPr/>
+        </p:nvPicPr>
+        <p:blipFill>
+          <a:blip r:embed="rId19" cstate="print">
+            <a:extLst>
+              <a:ext uri="{28A0092B-C50C-407E-A947-70E740481C1C}">
+                <a14:useLocalDpi xmlns:a14="http://schemas.microsoft.com/office/drawing/2010/main" val="0"/>
+              </a:ext>
+            </a:extLst>
+          </a:blip>
+          <a:srcRect/>
+          <a:stretch>
+            <a:fillRect/>
+          </a:stretch>
+        </p:blipFill>
+        <p:spPr bwMode="auto">
+          <a:xfrm>
+            <a:off x="18957295" y="21558646"/>
+            <a:ext cx="2217973" cy="385632"/>
+          </a:xfrm>
+          <a:prstGeom prst="rect">
+            <a:avLst/>
+          </a:prstGeom>
+          <a:noFill/>
+          <a:extLst>
+            <a:ext uri="{909E8E84-426E-40dd-AFC4-6F175D3DCCD1}">
+              <a14:hiddenFill xmlns:a14="http://schemas.microsoft.com/office/drawing/2010/main">
+                <a:solidFill>
+                  <a:srgbClr val="FFFFFF"/>
+                </a:solidFill>
+              </a14:hiddenFill>
+            </a:ext>
+          </a:extLst>
+        </p:spPr>
+      </p:pic>
+      <p:sp>
+        <p:nvSpPr>
+          <p:cNvPr id="17" name="TextBox 16"/>
+          <p:cNvSpPr txBox="1"/>
+          <p:nvPr/>
+        </p:nvSpPr>
+        <p:spPr>
+          <a:xfrm>
+            <a:off x="19685525" y="20097950"/>
+            <a:ext cx="2225925" cy="769441"/>
+          </a:xfrm>
+          <a:prstGeom prst="rect">
+            <a:avLst/>
+          </a:prstGeom>
+          <a:noFill/>
+        </p:spPr>
+        <p:txBody>
+          <a:bodyPr wrap="square" rtlCol="0">
+            <a:spAutoFit/>
+          </a:bodyPr>
+          <a:lstStyle/>
+          <a:p>
+            <a:r>
+              <a:rPr lang="en-US" sz="4400" dirty="0" err="1" smtClean="0"/>
+              <a:t>PRObE</a:t>
+            </a:r>
+            <a:endParaRPr lang="en-US" sz="4400" dirty="0"/>
+          </a:p>
+        </p:txBody>
+      </p:sp>
+      <p:pic>
+        <p:nvPicPr>
+          <p:cNvPr id="18" name="Picture 17"/>
+          <p:cNvPicPr>
+            <a:picLocks noChangeAspect="1"/>
+          </p:cNvPicPr>
+          <p:nvPr/>
+        </p:nvPicPr>
+        <p:blipFill>
+          <a:blip r:embed="rId20"/>
+          <a:stretch>
+            <a:fillRect/>
+          </a:stretch>
+        </p:blipFill>
+        <p:spPr>
+          <a:xfrm>
+            <a:off x="17907000" y="30087816"/>
+            <a:ext cx="2692400" cy="838200"/>
+          </a:xfrm>
+          <a:prstGeom prst="rect">
+            <a:avLst/>
+          </a:prstGeom>
+        </p:spPr>
+      </p:pic>
     </p:spTree>
   </p:cSld>
   <p:clrMapOvr>

</xml_diff>